<commit_message>
Updated links and text
</commit_message>
<xml_diff>
--- a/PathogenDataCourse/SlideSets/StrainTypingAndGenEpi.pptx
+++ b/PathogenDataCourse/SlideSets/StrainTypingAndGenEpi.pptx
@@ -1706,7 +1706,7 @@
           <a:p>
             <a:fld id="{C4181D7C-81F1-BA48-B0CF-02C398C91972}" type="datetimeFigureOut">
               <a:rPr lang="en-US" smtClean="0"/>
-              <a:t>7/17/23</a:t>
+              <a:t>7/18/23</a:t>
             </a:fld>
             <a:endParaRPr lang="en-US"/>
           </a:p>
@@ -3332,7 +3332,7 @@
             <a:fld id="{197342E9-89D0-D246-B0E5-635614E13D75}" type="datetime1">
               <a:rPr lang="en-GB" smtClean="0"/>
               <a:pPr/>
-              <a:t>17/07/2023</a:t>
+              <a:t>18/07/2023</a:t>
             </a:fld>
             <a:endParaRPr lang="en-US" dirty="0"/>
           </a:p>
@@ -7950,7 +7950,7 @@
             <a:fld id="{197342E9-89D0-D246-B0E5-635614E13D75}" type="datetime1">
               <a:rPr lang="en-GB" smtClean="0"/>
               <a:pPr/>
-              <a:t>17/07/2023</a:t>
+              <a:t>18/07/2023</a:t>
             </a:fld>
             <a:endParaRPr lang="en-US" dirty="0"/>
           </a:p>
@@ -11033,7 +11033,7 @@
             <a:fld id="{197342E9-89D0-D246-B0E5-635614E13D75}" type="datetime1">
               <a:rPr lang="en-GB" smtClean="0"/>
               <a:pPr/>
-              <a:t>17/07/2023</a:t>
+              <a:t>18/07/2023</a:t>
             </a:fld>
             <a:endParaRPr lang="en-US" dirty="0"/>
           </a:p>
@@ -14649,12 +14649,20 @@
           <a:p>
             <a:pPr algn="ctr"/>
             <a:r>
+              <a:rPr lang="en-US" dirty="0" err="1">
+                <a:solidFill>
+                  <a:schemeClr val="accent1"/>
+                </a:solidFill>
+              </a:rPr>
+              <a:t>MiniHash</a:t>
+            </a:r>
+            <a:r>
               <a:rPr lang="en-US" dirty="0">
                 <a:solidFill>
                   <a:schemeClr val="accent1"/>
                 </a:solidFill>
               </a:rPr>
-              <a:t>Mash-based approaches</a:t>
+              <a:t>-based approaches</a:t>
             </a:r>
           </a:p>
         </p:txBody>
@@ -14723,8 +14731,13 @@
             <a:pPr algn="just"/>
             <a:r>
               <a:rPr lang="en-GB" noProof="0" dirty="0"/>
-              <a:t>Mash</a:t>
-            </a:r>
+              <a:t>Mash (based on </a:t>
+            </a:r>
+            <a:r>
+              <a:rPr lang="en-GB" noProof="0"/>
+              <a:t>MiniHash</a:t>
+            </a:r>
+            <a:endParaRPr lang="en-GB" noProof="0" dirty="0"/>
           </a:p>
           <a:p>
             <a:pPr lvl="1" algn="just"/>
@@ -18091,21 +18104,6 @@
 </file>
 
 <file path=customXml/item1.xml><?xml version="1.0" encoding="utf-8"?>
-<?mso-contentType ?>
-<FormTemplates xmlns="http://schemas.microsoft.com/sharepoint/v3/contenttype/forms">
-  <Display>DocumentLibraryForm</Display>
-  <Edit>DocumentLibraryForm</Edit>
-  <New>DocumentLibraryForm</New>
-</FormTemplates>
-</file>
-
-<file path=customXml/item2.xml><?xml version="1.0" encoding="utf-8"?>
-<p:properties xmlns:p="http://schemas.microsoft.com/office/2006/metadata/properties" xmlns:xsi="http://www.w3.org/2001/XMLSchema-instance" xmlns:pc="http://schemas.microsoft.com/office/infopath/2007/PartnerControls">
-  <documentManagement/>
-</p:properties>
-</file>
-
-<file path=customXml/item3.xml><?xml version="1.0" encoding="utf-8"?>
 <ct:contentTypeSchema xmlns:ct="http://schemas.microsoft.com/office/2006/metadata/contentType" xmlns:ma="http://schemas.microsoft.com/office/2006/metadata/properties/metaAttributes" ct:_="" ma:_="" ma:contentTypeName="Document" ma:contentTypeID="0x010100E248A64365211844BF30BC3ADD420261" ma:contentTypeVersion="11" ma:contentTypeDescription="Create a new document." ma:contentTypeScope="" ma:versionID="bf0b94b058452ed3cec91f89e664909d">
   <xsd:schema xmlns:xsd="http://www.w3.org/2001/XMLSchema" xmlns:xs="http://www.w3.org/2001/XMLSchema" xmlns:p="http://schemas.microsoft.com/office/2006/metadata/properties" xmlns:ns2="8dbe2aa3-3237-4830-85c4-3d48417ef302" xmlns:ns3="b317b901-4ab4-4161-80c3-da5df50c25bf" targetNamespace="http://schemas.microsoft.com/office/2006/metadata/properties" ma:root="true" ma:fieldsID="d988d784501c0b668dd73c0ebdbd98a4" ns2:_="" ns3:_="">
     <xsd:import namespace="8dbe2aa3-3237-4830-85c4-3d48417ef302"/>
@@ -18316,10 +18314,36 @@
 </ct:contentTypeSchema>
 </file>
 
+<file path=customXml/item2.xml><?xml version="1.0" encoding="utf-8"?>
+<p:properties xmlns:p="http://schemas.microsoft.com/office/2006/metadata/properties" xmlns:xsi="http://www.w3.org/2001/XMLSchema-instance" xmlns:pc="http://schemas.microsoft.com/office/infopath/2007/PartnerControls">
+  <documentManagement/>
+</p:properties>
+</file>
+
+<file path=customXml/item3.xml><?xml version="1.0" encoding="utf-8"?>
+<?mso-contentType ?>
+<FormTemplates xmlns="http://schemas.microsoft.com/sharepoint/v3/contenttype/forms">
+  <Display>DocumentLibraryForm</Display>
+  <Edit>DocumentLibraryForm</Edit>
+  <New>DocumentLibraryForm</New>
+</FormTemplates>
+</file>
+
 <file path=customXml/itemProps1.xml><?xml version="1.0" encoding="utf-8"?>
-<ds:datastoreItem xmlns:ds="http://schemas.openxmlformats.org/officeDocument/2006/customXml" ds:itemID="{B1063616-57F3-4C87-BB7F-2974CF36DE76}">
+<ds:datastoreItem xmlns:ds="http://schemas.openxmlformats.org/officeDocument/2006/customXml" ds:itemID="{72E4F038-6994-4608-A1EA-AF583DA06B5C}">
   <ds:schemaRefs>
-    <ds:schemaRef ds:uri="http://schemas.microsoft.com/sharepoint/v3/contenttype/forms"/>
+    <ds:schemaRef ds:uri="http://schemas.microsoft.com/office/2006/metadata/contentType"/>
+    <ds:schemaRef ds:uri="http://schemas.microsoft.com/office/2006/metadata/properties/metaAttributes"/>
+    <ds:schemaRef ds:uri="http://www.w3.org/2001/XMLSchema"/>
+    <ds:schemaRef ds:uri="http://schemas.microsoft.com/office/2006/metadata/properties"/>
+    <ds:schemaRef ds:uri="8dbe2aa3-3237-4830-85c4-3d48417ef302"/>
+    <ds:schemaRef ds:uri="b317b901-4ab4-4161-80c3-da5df50c25bf"/>
+    <ds:schemaRef ds:uri="http://schemas.microsoft.com/office/2006/documentManagement/types"/>
+    <ds:schemaRef ds:uri="http://schemas.microsoft.com/office/infopath/2007/PartnerControls"/>
+    <ds:schemaRef ds:uri="http://schemas.openxmlformats.org/package/2006/metadata/core-properties"/>
+    <ds:schemaRef ds:uri="http://purl.org/dc/elements/1.1/"/>
+    <ds:schemaRef ds:uri="http://purl.org/dc/terms/"/>
+    <ds:schemaRef ds:uri="http://schemas.microsoft.com/internal/obd"/>
   </ds:schemaRefs>
 </ds:datastoreItem>
 </file>
@@ -18342,20 +18366,9 @@
 </file>
 
 <file path=customXml/itemProps3.xml><?xml version="1.0" encoding="utf-8"?>
-<ds:datastoreItem xmlns:ds="http://schemas.openxmlformats.org/officeDocument/2006/customXml" ds:itemID="{72E4F038-6994-4608-A1EA-AF583DA06B5C}">
+<ds:datastoreItem xmlns:ds="http://schemas.openxmlformats.org/officeDocument/2006/customXml" ds:itemID="{B1063616-57F3-4C87-BB7F-2974CF36DE76}">
   <ds:schemaRefs>
-    <ds:schemaRef ds:uri="http://schemas.microsoft.com/office/2006/metadata/contentType"/>
-    <ds:schemaRef ds:uri="http://schemas.microsoft.com/office/2006/metadata/properties/metaAttributes"/>
-    <ds:schemaRef ds:uri="http://www.w3.org/2001/XMLSchema"/>
-    <ds:schemaRef ds:uri="http://schemas.microsoft.com/office/2006/metadata/properties"/>
-    <ds:schemaRef ds:uri="8dbe2aa3-3237-4830-85c4-3d48417ef302"/>
-    <ds:schemaRef ds:uri="b317b901-4ab4-4161-80c3-da5df50c25bf"/>
-    <ds:schemaRef ds:uri="http://schemas.microsoft.com/office/2006/documentManagement/types"/>
-    <ds:schemaRef ds:uri="http://schemas.microsoft.com/office/infopath/2007/PartnerControls"/>
-    <ds:schemaRef ds:uri="http://schemas.openxmlformats.org/package/2006/metadata/core-properties"/>
-    <ds:schemaRef ds:uri="http://purl.org/dc/elements/1.1/"/>
-    <ds:schemaRef ds:uri="http://purl.org/dc/terms/"/>
-    <ds:schemaRef ds:uri="http://schemas.microsoft.com/internal/obd"/>
+    <ds:schemaRef ds:uri="http://schemas.microsoft.com/sharepoint/v3/contenttype/forms"/>
   </ds:schemaRefs>
 </ds:datastoreItem>
 </file>
</xml_diff>

<commit_message>
Fixed typos and formatting
</commit_message>
<xml_diff>
--- a/PathogenDataCourse/SlideSets/StrainTypingAndGenEpi.pptx
+++ b/PathogenDataCourse/SlideSets/StrainTypingAndGenEpi.pptx
@@ -14654,7 +14654,7 @@
                   <a:schemeClr val="accent1"/>
                 </a:solidFill>
               </a:rPr>
-              <a:t>MiniHash</a:t>
+              <a:t>MinHash</a:t>
             </a:r>
             <a:r>
               <a:rPr lang="en-US" dirty="0">
@@ -14724,7 +14724,7 @@
         </p:spPr>
         <p:txBody>
           <a:bodyPr>
-            <a:normAutofit fontScale="92500"/>
+            <a:normAutofit fontScale="92500" lnSpcReduction="10000"/>
           </a:bodyPr>
           <a:lstStyle/>
           <a:p>
@@ -14734,10 +14734,13 @@
               <a:t>Mash (based on </a:t>
             </a:r>
             <a:r>
-              <a:rPr lang="en-GB" noProof="0"/>
-              <a:t>MiniHash</a:t>
-            </a:r>
-            <a:endParaRPr lang="en-GB" noProof="0" dirty="0"/>
+              <a:rPr lang="en-GB" noProof="0" dirty="0" err="1"/>
+              <a:t>MinHash</a:t>
+            </a:r>
+            <a:r>
+              <a:rPr lang="en-GB" noProof="0" dirty="0"/>
+              <a:t>)</a:t>
+            </a:r>
           </a:p>
           <a:p>
             <a:pPr lvl="1" algn="just"/>
@@ -14808,6 +14811,18 @@
               <a:rPr lang="en-GB" dirty="0"/>
               <a:t>Are there transmission clusters in my data?</a:t>
             </a:r>
+          </a:p>
+          <a:p>
+            <a:pPr lvl="1" algn="just"/>
+            <a:r>
+              <a:rPr lang="en-GB" noProof="0" dirty="0"/>
+              <a:t>Do my sequences belong to existing clusters/</a:t>
+            </a:r>
+            <a:r>
+              <a:rPr lang="en-GB" noProof="0"/>
+              <a:t>types?</a:t>
+            </a:r>
+            <a:endParaRPr lang="en-GB" dirty="0"/>
           </a:p>
           <a:p>
             <a:pPr algn="just"/>
@@ -15461,99 +15476,58 @@
         </p:spPr>
         <p:txBody>
           <a:bodyPr>
-            <a:normAutofit lnSpcReduction="10000"/>
+            <a:normAutofit/>
           </a:bodyPr>
           <a:lstStyle/>
           <a:p>
             <a:r>
               <a:rPr lang="en-GB" sz="2800" noProof="0" dirty="0"/>
-              <a:t>Typing bacterial strains</a:t>
-            </a:r>
-          </a:p>
-          <a:p>
-            <a:pPr lvl="1"/>
+              <a:t>State the different levels at which bacterial typing occurs</a:t>
+            </a:r>
+          </a:p>
+          <a:p>
+            <a:endParaRPr lang="en-GB" sz="2800" noProof="0" dirty="0"/>
+          </a:p>
+          <a:p>
+            <a:r>
+              <a:rPr lang="en-GB" sz="2800" noProof="0" dirty="0"/>
+              <a:t>Explain the basis of ANI and MLST for species and strain typing</a:t>
+            </a:r>
+          </a:p>
+          <a:p>
+            <a:endParaRPr lang="en-GB" sz="2500" noProof="0" dirty="0"/>
+          </a:p>
+          <a:p>
             <a:r>
               <a:rPr lang="en-GB" sz="2500" noProof="0" dirty="0"/>
-              <a:t>ANI</a:t>
-            </a:r>
-          </a:p>
-          <a:p>
-            <a:pPr lvl="1"/>
-            <a:r>
-              <a:rPr lang="en-GB" sz="2500" noProof="0" dirty="0"/>
-              <a:t>MLST</a:t>
-            </a:r>
-          </a:p>
-          <a:p>
-            <a:pPr lvl="2"/>
-            <a:r>
-              <a:rPr lang="en-GB" sz="2300" noProof="0" dirty="0"/>
-              <a:t>Species-specific schemes</a:t>
-            </a:r>
-          </a:p>
-          <a:p>
-            <a:pPr lvl="1"/>
+              <a:t>State the differences between MLST and </a:t>
+            </a:r>
             <a:r>
               <a:rPr lang="en-GB" sz="2500" noProof="0" dirty="0" err="1"/>
               <a:t>cgMLST</a:t>
             </a:r>
+            <a:r>
+              <a:rPr lang="en-GB" sz="2500" noProof="0" dirty="0"/>
+              <a:t> in terms of resolution and use</a:t>
+            </a:r>
+          </a:p>
+          <a:p>
+            <a:endParaRPr lang="en-GB" dirty="0"/>
+          </a:p>
+          <a:p>
+            <a:r>
+              <a:rPr lang="en-GB" dirty="0"/>
+              <a:t>Recognise </a:t>
+            </a:r>
+            <a:r>
+              <a:rPr lang="en-GB" dirty="0" err="1"/>
+              <a:t>MinHash</a:t>
+            </a:r>
+            <a:r>
+              <a:rPr lang="en-GB" dirty="0"/>
+              <a:t> and MST approaches for genomic epidemiology</a:t>
+            </a:r>
             <a:endParaRPr lang="en-GB" sz="2500" noProof="0" dirty="0"/>
-          </a:p>
-          <a:p>
-            <a:pPr lvl="1"/>
-            <a:r>
-              <a:rPr lang="en-GB" sz="2500" noProof="0" dirty="0"/>
-              <a:t>Lineages</a:t>
-            </a:r>
-          </a:p>
-          <a:p>
-            <a:pPr lvl="1"/>
-            <a:r>
-              <a:rPr lang="en-GB" sz="2500" noProof="0" dirty="0"/>
-              <a:t>Lineage defining SNPs</a:t>
-            </a:r>
-          </a:p>
-          <a:p>
-            <a:r>
-              <a:rPr lang="en-GB" sz="2800" noProof="0" dirty="0"/>
-              <a:t>Matching samples</a:t>
-            </a:r>
-          </a:p>
-          <a:p>
-            <a:pPr lvl="1"/>
-            <a:r>
-              <a:rPr lang="en-GB" sz="2500" noProof="0" dirty="0" err="1"/>
-              <a:t>Sourmash</a:t>
-            </a:r>
-            <a:r>
-              <a:rPr lang="en-GB" sz="2500" noProof="0" dirty="0"/>
-              <a:t> and sketches</a:t>
-            </a:r>
-          </a:p>
-          <a:p>
-            <a:pPr lvl="1"/>
-            <a:r>
-              <a:rPr lang="en-GB" sz="2500" noProof="0" dirty="0"/>
-              <a:t>Minimum spanning trees</a:t>
-            </a:r>
-          </a:p>
-          <a:p>
-            <a:pPr lvl="1"/>
-            <a:r>
-              <a:rPr lang="en-GB" sz="2500" noProof="0" dirty="0"/>
-              <a:t>MRSA example</a:t>
-            </a:r>
-          </a:p>
-          <a:p>
-            <a:pPr lvl="1"/>
-            <a:r>
-              <a:rPr lang="en-GB" sz="2500" noProof="0" dirty="0" err="1"/>
-              <a:t>PopPUNK</a:t>
-            </a:r>
-            <a:r>
-              <a:rPr lang="en-GB" sz="2500" noProof="0" dirty="0"/>
-              <a:t> in variable populations</a:t>
-            </a:r>
           </a:p>
         </p:txBody>
       </p:sp>
@@ -18104,6 +18078,21 @@
 </file>
 
 <file path=customXml/item1.xml><?xml version="1.0" encoding="utf-8"?>
+<?mso-contentType ?>
+<FormTemplates xmlns="http://schemas.microsoft.com/sharepoint/v3/contenttype/forms">
+  <Display>DocumentLibraryForm</Display>
+  <Edit>DocumentLibraryForm</Edit>
+  <New>DocumentLibraryForm</New>
+</FormTemplates>
+</file>
+
+<file path=customXml/item2.xml><?xml version="1.0" encoding="utf-8"?>
+<p:properties xmlns:p="http://schemas.microsoft.com/office/2006/metadata/properties" xmlns:xsi="http://www.w3.org/2001/XMLSchema-instance" xmlns:pc="http://schemas.microsoft.com/office/infopath/2007/PartnerControls">
+  <documentManagement/>
+</p:properties>
+</file>
+
+<file path=customXml/item3.xml><?xml version="1.0" encoding="utf-8"?>
 <ct:contentTypeSchema xmlns:ct="http://schemas.microsoft.com/office/2006/metadata/contentType" xmlns:ma="http://schemas.microsoft.com/office/2006/metadata/properties/metaAttributes" ct:_="" ma:_="" ma:contentTypeName="Document" ma:contentTypeID="0x010100E248A64365211844BF30BC3ADD420261" ma:contentTypeVersion="11" ma:contentTypeDescription="Create a new document." ma:contentTypeScope="" ma:versionID="bf0b94b058452ed3cec91f89e664909d">
   <xsd:schema xmlns:xsd="http://www.w3.org/2001/XMLSchema" xmlns:xs="http://www.w3.org/2001/XMLSchema" xmlns:p="http://schemas.microsoft.com/office/2006/metadata/properties" xmlns:ns2="8dbe2aa3-3237-4830-85c4-3d48417ef302" xmlns:ns3="b317b901-4ab4-4161-80c3-da5df50c25bf" targetNamespace="http://schemas.microsoft.com/office/2006/metadata/properties" ma:root="true" ma:fieldsID="d988d784501c0b668dd73c0ebdbd98a4" ns2:_="" ns3:_="">
     <xsd:import namespace="8dbe2aa3-3237-4830-85c4-3d48417ef302"/>
@@ -18314,36 +18303,10 @@
 </ct:contentTypeSchema>
 </file>
 
-<file path=customXml/item2.xml><?xml version="1.0" encoding="utf-8"?>
-<p:properties xmlns:p="http://schemas.microsoft.com/office/2006/metadata/properties" xmlns:xsi="http://www.w3.org/2001/XMLSchema-instance" xmlns:pc="http://schemas.microsoft.com/office/infopath/2007/PartnerControls">
-  <documentManagement/>
-</p:properties>
-</file>
-
-<file path=customXml/item3.xml><?xml version="1.0" encoding="utf-8"?>
-<?mso-contentType ?>
-<FormTemplates xmlns="http://schemas.microsoft.com/sharepoint/v3/contenttype/forms">
-  <Display>DocumentLibraryForm</Display>
-  <Edit>DocumentLibraryForm</Edit>
-  <New>DocumentLibraryForm</New>
-</FormTemplates>
-</file>
-
 <file path=customXml/itemProps1.xml><?xml version="1.0" encoding="utf-8"?>
-<ds:datastoreItem xmlns:ds="http://schemas.openxmlformats.org/officeDocument/2006/customXml" ds:itemID="{72E4F038-6994-4608-A1EA-AF583DA06B5C}">
+<ds:datastoreItem xmlns:ds="http://schemas.openxmlformats.org/officeDocument/2006/customXml" ds:itemID="{B1063616-57F3-4C87-BB7F-2974CF36DE76}">
   <ds:schemaRefs>
-    <ds:schemaRef ds:uri="http://schemas.microsoft.com/office/2006/metadata/contentType"/>
-    <ds:schemaRef ds:uri="http://schemas.microsoft.com/office/2006/metadata/properties/metaAttributes"/>
-    <ds:schemaRef ds:uri="http://www.w3.org/2001/XMLSchema"/>
-    <ds:schemaRef ds:uri="http://schemas.microsoft.com/office/2006/metadata/properties"/>
-    <ds:schemaRef ds:uri="8dbe2aa3-3237-4830-85c4-3d48417ef302"/>
-    <ds:schemaRef ds:uri="b317b901-4ab4-4161-80c3-da5df50c25bf"/>
-    <ds:schemaRef ds:uri="http://schemas.microsoft.com/office/2006/documentManagement/types"/>
-    <ds:schemaRef ds:uri="http://schemas.microsoft.com/office/infopath/2007/PartnerControls"/>
-    <ds:schemaRef ds:uri="http://schemas.openxmlformats.org/package/2006/metadata/core-properties"/>
-    <ds:schemaRef ds:uri="http://purl.org/dc/elements/1.1/"/>
-    <ds:schemaRef ds:uri="http://purl.org/dc/terms/"/>
-    <ds:schemaRef ds:uri="http://schemas.microsoft.com/internal/obd"/>
+    <ds:schemaRef ds:uri="http://schemas.microsoft.com/sharepoint/v3/contenttype/forms"/>
   </ds:schemaRefs>
 </ds:datastoreItem>
 </file>
@@ -18366,9 +18329,20 @@
 </file>
 
 <file path=customXml/itemProps3.xml><?xml version="1.0" encoding="utf-8"?>
-<ds:datastoreItem xmlns:ds="http://schemas.openxmlformats.org/officeDocument/2006/customXml" ds:itemID="{B1063616-57F3-4C87-BB7F-2974CF36DE76}">
+<ds:datastoreItem xmlns:ds="http://schemas.openxmlformats.org/officeDocument/2006/customXml" ds:itemID="{72E4F038-6994-4608-A1EA-AF583DA06B5C}">
   <ds:schemaRefs>
-    <ds:schemaRef ds:uri="http://schemas.microsoft.com/sharepoint/v3/contenttype/forms"/>
+    <ds:schemaRef ds:uri="http://schemas.microsoft.com/office/2006/metadata/contentType"/>
+    <ds:schemaRef ds:uri="http://schemas.microsoft.com/office/2006/metadata/properties/metaAttributes"/>
+    <ds:schemaRef ds:uri="http://www.w3.org/2001/XMLSchema"/>
+    <ds:schemaRef ds:uri="http://schemas.microsoft.com/office/2006/metadata/properties"/>
+    <ds:schemaRef ds:uri="8dbe2aa3-3237-4830-85c4-3d48417ef302"/>
+    <ds:schemaRef ds:uri="b317b901-4ab4-4161-80c3-da5df50c25bf"/>
+    <ds:schemaRef ds:uri="http://schemas.microsoft.com/office/2006/documentManagement/types"/>
+    <ds:schemaRef ds:uri="http://schemas.microsoft.com/office/infopath/2007/PartnerControls"/>
+    <ds:schemaRef ds:uri="http://schemas.openxmlformats.org/package/2006/metadata/core-properties"/>
+    <ds:schemaRef ds:uri="http://purl.org/dc/elements/1.1/"/>
+    <ds:schemaRef ds:uri="http://purl.org/dc/terms/"/>
+    <ds:schemaRef ds:uri="http://schemas.microsoft.com/internal/obd"/>
   </ds:schemaRefs>
 </ds:datastoreItem>
 </file>
</xml_diff>